<commit_message>
Actividades TA4 + carpeta words envío actividades
Activiades y ejercicios de clase.
En carpeta [JAVA] creacicón carpeta C2 - TA4
</commit_message>
<xml_diff>
--- a/[JAVA]/Comandos Java.pptx
+++ b/[JAVA]/Comandos Java.pptx
@@ -259,7 +259,7 @@
           <a:p>
             <a:fld id="{3500814B-B0A1-4EE7-B2F5-06E5A1055567}" type="datetimeFigureOut">
               <a:rPr lang="es-ES" smtClean="0"/>
-              <a:t>02/02/2024</a:t>
+              <a:t>05/02/2024</a:t>
             </a:fld>
             <a:endParaRPr lang="es-ES"/>
           </a:p>
@@ -457,7 +457,7 @@
           <a:p>
             <a:fld id="{3500814B-B0A1-4EE7-B2F5-06E5A1055567}" type="datetimeFigureOut">
               <a:rPr lang="es-ES" smtClean="0"/>
-              <a:t>02/02/2024</a:t>
+              <a:t>05/02/2024</a:t>
             </a:fld>
             <a:endParaRPr lang="es-ES"/>
           </a:p>
@@ -665,7 +665,7 @@
           <a:p>
             <a:fld id="{3500814B-B0A1-4EE7-B2F5-06E5A1055567}" type="datetimeFigureOut">
               <a:rPr lang="es-ES" smtClean="0"/>
-              <a:t>02/02/2024</a:t>
+              <a:t>05/02/2024</a:t>
             </a:fld>
             <a:endParaRPr lang="es-ES"/>
           </a:p>
@@ -863,7 +863,7 @@
           <a:p>
             <a:fld id="{3500814B-B0A1-4EE7-B2F5-06E5A1055567}" type="datetimeFigureOut">
               <a:rPr lang="es-ES" smtClean="0"/>
-              <a:t>02/02/2024</a:t>
+              <a:t>05/02/2024</a:t>
             </a:fld>
             <a:endParaRPr lang="es-ES"/>
           </a:p>
@@ -1138,7 +1138,7 @@
           <a:p>
             <a:fld id="{3500814B-B0A1-4EE7-B2F5-06E5A1055567}" type="datetimeFigureOut">
               <a:rPr lang="es-ES" smtClean="0"/>
-              <a:t>02/02/2024</a:t>
+              <a:t>05/02/2024</a:t>
             </a:fld>
             <a:endParaRPr lang="es-ES"/>
           </a:p>
@@ -1403,7 +1403,7 @@
           <a:p>
             <a:fld id="{3500814B-B0A1-4EE7-B2F5-06E5A1055567}" type="datetimeFigureOut">
               <a:rPr lang="es-ES" smtClean="0"/>
-              <a:t>02/02/2024</a:t>
+              <a:t>05/02/2024</a:t>
             </a:fld>
             <a:endParaRPr lang="es-ES"/>
           </a:p>
@@ -1815,7 +1815,7 @@
           <a:p>
             <a:fld id="{3500814B-B0A1-4EE7-B2F5-06E5A1055567}" type="datetimeFigureOut">
               <a:rPr lang="es-ES" smtClean="0"/>
-              <a:t>02/02/2024</a:t>
+              <a:t>05/02/2024</a:t>
             </a:fld>
             <a:endParaRPr lang="es-ES"/>
           </a:p>
@@ -1956,7 +1956,7 @@
           <a:p>
             <a:fld id="{3500814B-B0A1-4EE7-B2F5-06E5A1055567}" type="datetimeFigureOut">
               <a:rPr lang="es-ES" smtClean="0"/>
-              <a:t>02/02/2024</a:t>
+              <a:t>05/02/2024</a:t>
             </a:fld>
             <a:endParaRPr lang="es-ES"/>
           </a:p>
@@ -2069,7 +2069,7 @@
           <a:p>
             <a:fld id="{3500814B-B0A1-4EE7-B2F5-06E5A1055567}" type="datetimeFigureOut">
               <a:rPr lang="es-ES" smtClean="0"/>
-              <a:t>02/02/2024</a:t>
+              <a:t>05/02/2024</a:t>
             </a:fld>
             <a:endParaRPr lang="es-ES"/>
           </a:p>
@@ -2380,7 +2380,7 @@
           <a:p>
             <a:fld id="{3500814B-B0A1-4EE7-B2F5-06E5A1055567}" type="datetimeFigureOut">
               <a:rPr lang="es-ES" smtClean="0"/>
-              <a:t>02/02/2024</a:t>
+              <a:t>05/02/2024</a:t>
             </a:fld>
             <a:endParaRPr lang="es-ES"/>
           </a:p>
@@ -2668,7 +2668,7 @@
           <a:p>
             <a:fld id="{3500814B-B0A1-4EE7-B2F5-06E5A1055567}" type="datetimeFigureOut">
               <a:rPr lang="es-ES" smtClean="0"/>
-              <a:t>02/02/2024</a:t>
+              <a:t>05/02/2024</a:t>
             </a:fld>
             <a:endParaRPr lang="es-ES"/>
           </a:p>
@@ -2909,7 +2909,7 @@
           <a:p>
             <a:fld id="{3500814B-B0A1-4EE7-B2F5-06E5A1055567}" type="datetimeFigureOut">
               <a:rPr lang="es-ES" smtClean="0"/>
-              <a:t>02/02/2024</a:t>
+              <a:t>05/02/2024</a:t>
             </a:fld>
             <a:endParaRPr lang="es-ES"/>
           </a:p>
@@ -3507,7 +3507,11 @@
             </a:r>
             <a:r>
               <a:rPr lang="es-ES" dirty="0"/>
-              <a:t>comparan valores.</a:t>
+              <a:t>comparan valores; </a:t>
+            </a:r>
+            <a:r>
+              <a:rPr lang="es-ES" u="sng" dirty="0"/>
+              <a:t>son preguntas.</a:t>
             </a:r>
           </a:p>
           <a:p>
@@ -3590,6 +3594,35 @@
             <a:endParaRPr lang="es-ES" i="1" dirty="0"/>
           </a:p>
           <a:p>
+            <a:pPr algn="ctr"/>
+            <a:r>
+              <a:rPr lang="es-ES" i="1" dirty="0"/>
+              <a:t> Eclipse: </a:t>
+            </a:r>
+            <a:r>
+              <a:rPr lang="es-ES" i="1" dirty="0" err="1"/>
+              <a:t>syso+CTRL+espacio</a:t>
+            </a:r>
+            <a:r>
+              <a:rPr lang="es-ES" i="1" dirty="0"/>
+              <a:t> = </a:t>
+            </a:r>
+            <a:r>
+              <a:rPr lang="es-ES" b="1" i="1" dirty="0" err="1">
+                <a:solidFill>
+                  <a:srgbClr val="7030A0"/>
+                </a:solidFill>
+              </a:rPr>
+              <a:t>System.out.println</a:t>
+            </a:r>
+            <a:r>
+              <a:rPr lang="es-ES" b="1" dirty="0">
+                <a:solidFill>
+                  <a:srgbClr val="7030A0"/>
+                </a:solidFill>
+              </a:rPr>
+              <a:t> </a:t>
+            </a:r>
             <a:endParaRPr lang="es-ES" dirty="0"/>
           </a:p>
         </p:txBody>

</xml_diff>

<commit_message>
TA05 para subir + TA05 en Power
Finalización word para entrega de tareas.
Estuve actualizando el power para los apuntes.
</commit_message>
<xml_diff>
--- a/[JAVA]/Comandos Java.pptx
+++ b/[JAVA]/Comandos Java.pptx
@@ -7,10 +7,12 @@
   <p:sldIdLst>
     <p:sldId id="256" r:id="rId2"/>
     <p:sldId id="257" r:id="rId3"/>
-    <p:sldId id="259" r:id="rId4"/>
-    <p:sldId id="260" r:id="rId5"/>
-    <p:sldId id="262" r:id="rId6"/>
-    <p:sldId id="263" r:id="rId7"/>
+    <p:sldId id="265" r:id="rId4"/>
+    <p:sldId id="259" r:id="rId5"/>
+    <p:sldId id="260" r:id="rId6"/>
+    <p:sldId id="262" r:id="rId7"/>
+    <p:sldId id="263" r:id="rId8"/>
+    <p:sldId id="264" r:id="rId9"/>
   </p:sldIdLst>
   <p:sldSz cx="12192000" cy="6858000"/>
   <p:notesSz cx="6858000" cy="9144000"/>
@@ -264,7 +266,7 @@
           <a:p>
             <a:fld id="{3500814B-B0A1-4EE7-B2F5-06E5A1055567}" type="datetimeFigureOut">
               <a:rPr lang="es-ES" smtClean="0"/>
-              <a:t>08/02/2024</a:t>
+              <a:t>13/02/2024</a:t>
             </a:fld>
             <a:endParaRPr lang="es-ES"/>
           </a:p>
@@ -462,7 +464,7 @@
           <a:p>
             <a:fld id="{3500814B-B0A1-4EE7-B2F5-06E5A1055567}" type="datetimeFigureOut">
               <a:rPr lang="es-ES" smtClean="0"/>
-              <a:t>08/02/2024</a:t>
+              <a:t>13/02/2024</a:t>
             </a:fld>
             <a:endParaRPr lang="es-ES"/>
           </a:p>
@@ -670,7 +672,7 @@
           <a:p>
             <a:fld id="{3500814B-B0A1-4EE7-B2F5-06E5A1055567}" type="datetimeFigureOut">
               <a:rPr lang="es-ES" smtClean="0"/>
-              <a:t>08/02/2024</a:t>
+              <a:t>13/02/2024</a:t>
             </a:fld>
             <a:endParaRPr lang="es-ES"/>
           </a:p>
@@ -868,7 +870,7 @@
           <a:p>
             <a:fld id="{3500814B-B0A1-4EE7-B2F5-06E5A1055567}" type="datetimeFigureOut">
               <a:rPr lang="es-ES" smtClean="0"/>
-              <a:t>08/02/2024</a:t>
+              <a:t>13/02/2024</a:t>
             </a:fld>
             <a:endParaRPr lang="es-ES"/>
           </a:p>
@@ -1143,7 +1145,7 @@
           <a:p>
             <a:fld id="{3500814B-B0A1-4EE7-B2F5-06E5A1055567}" type="datetimeFigureOut">
               <a:rPr lang="es-ES" smtClean="0"/>
-              <a:t>08/02/2024</a:t>
+              <a:t>13/02/2024</a:t>
             </a:fld>
             <a:endParaRPr lang="es-ES"/>
           </a:p>
@@ -1408,7 +1410,7 @@
           <a:p>
             <a:fld id="{3500814B-B0A1-4EE7-B2F5-06E5A1055567}" type="datetimeFigureOut">
               <a:rPr lang="es-ES" smtClean="0"/>
-              <a:t>08/02/2024</a:t>
+              <a:t>13/02/2024</a:t>
             </a:fld>
             <a:endParaRPr lang="es-ES"/>
           </a:p>
@@ -1820,7 +1822,7 @@
           <a:p>
             <a:fld id="{3500814B-B0A1-4EE7-B2F5-06E5A1055567}" type="datetimeFigureOut">
               <a:rPr lang="es-ES" smtClean="0"/>
-              <a:t>08/02/2024</a:t>
+              <a:t>13/02/2024</a:t>
             </a:fld>
             <a:endParaRPr lang="es-ES"/>
           </a:p>
@@ -1961,7 +1963,7 @@
           <a:p>
             <a:fld id="{3500814B-B0A1-4EE7-B2F5-06E5A1055567}" type="datetimeFigureOut">
               <a:rPr lang="es-ES" smtClean="0"/>
-              <a:t>08/02/2024</a:t>
+              <a:t>13/02/2024</a:t>
             </a:fld>
             <a:endParaRPr lang="es-ES"/>
           </a:p>
@@ -2074,7 +2076,7 @@
           <a:p>
             <a:fld id="{3500814B-B0A1-4EE7-B2F5-06E5A1055567}" type="datetimeFigureOut">
               <a:rPr lang="es-ES" smtClean="0"/>
-              <a:t>08/02/2024</a:t>
+              <a:t>13/02/2024</a:t>
             </a:fld>
             <a:endParaRPr lang="es-ES"/>
           </a:p>
@@ -2385,7 +2387,7 @@
           <a:p>
             <a:fld id="{3500814B-B0A1-4EE7-B2F5-06E5A1055567}" type="datetimeFigureOut">
               <a:rPr lang="es-ES" smtClean="0"/>
-              <a:t>08/02/2024</a:t>
+              <a:t>13/02/2024</a:t>
             </a:fld>
             <a:endParaRPr lang="es-ES"/>
           </a:p>
@@ -2673,7 +2675,7 @@
           <a:p>
             <a:fld id="{3500814B-B0A1-4EE7-B2F5-06E5A1055567}" type="datetimeFigureOut">
               <a:rPr lang="es-ES" smtClean="0"/>
-              <a:t>08/02/2024</a:t>
+              <a:t>13/02/2024</a:t>
             </a:fld>
             <a:endParaRPr lang="es-ES"/>
           </a:p>
@@ -2914,7 +2916,7 @@
           <a:p>
             <a:fld id="{3500814B-B0A1-4EE7-B2F5-06E5A1055567}" type="datetimeFigureOut">
               <a:rPr lang="es-ES" smtClean="0"/>
-              <a:t>08/02/2024</a:t>
+              <a:t>13/02/2024</a:t>
             </a:fld>
             <a:endParaRPr lang="es-ES"/>
           </a:p>
@@ -4490,6 +4492,1093 @@
         <p:cNvPr id="1" name="">
           <a:extLst>
             <a:ext uri="{FF2B5EF4-FFF2-40B4-BE49-F238E27FC236}">
+              <a16:creationId xmlns:a16="http://schemas.microsoft.com/office/drawing/2014/main" id="{F3CBC785-C518-401D-E481-7CC113425C61}"/>
+            </a:ext>
+          </a:extLst>
+        </p:cNvPr>
+        <p:cNvGrpSpPr/>
+        <p:nvPr/>
+      </p:nvGrpSpPr>
+      <p:grpSpPr>
+        <a:xfrm>
+          <a:off x="0" y="0"/>
+          <a:ext cx="0" cy="0"/>
+          <a:chOff x="0" y="0"/>
+          <a:chExt cx="0" cy="0"/>
+        </a:xfrm>
+      </p:grpSpPr>
+      <p:sp>
+        <p:nvSpPr>
+          <p:cNvPr id="6" name="CuadroTexto 5">
+            <a:extLst>
+              <a:ext uri="{FF2B5EF4-FFF2-40B4-BE49-F238E27FC236}">
+                <a16:creationId xmlns:a16="http://schemas.microsoft.com/office/drawing/2014/main" id="{8BDB333B-85C4-092E-4D4B-C81C40FFC802}"/>
+              </a:ext>
+            </a:extLst>
+          </p:cNvPr>
+          <p:cNvSpPr txBox="1"/>
+          <p:nvPr/>
+        </p:nvSpPr>
+        <p:spPr>
+          <a:xfrm>
+            <a:off x="1152746" y="203962"/>
+            <a:ext cx="2838450" cy="584775"/>
+          </a:xfrm>
+          <a:prstGeom prst="rect">
+            <a:avLst/>
+          </a:prstGeom>
+          <a:noFill/>
+          <a:ln w="19050">
+            <a:solidFill>
+              <a:schemeClr val="tx1"/>
+            </a:solidFill>
+          </a:ln>
+        </p:spPr>
+        <p:txBody>
+          <a:bodyPr wrap="square" rtlCol="0">
+            <a:spAutoFit/>
+          </a:bodyPr>
+          <a:lstStyle/>
+          <a:p>
+            <a:pPr algn="ctr"/>
+            <a:r>
+              <a:rPr lang="es-ES" sz="3200" b="1" dirty="0"/>
+              <a:t>C2 JAVA BASICS</a:t>
+            </a:r>
+          </a:p>
+        </p:txBody>
+      </p:sp>
+      <p:sp>
+        <p:nvSpPr>
+          <p:cNvPr id="7" name="Elipse 6">
+            <a:extLst>
+              <a:ext uri="{FF2B5EF4-FFF2-40B4-BE49-F238E27FC236}">
+                <a16:creationId xmlns:a16="http://schemas.microsoft.com/office/drawing/2014/main" id="{EEA54544-966A-C4B1-7024-C89CB78D24A3}"/>
+              </a:ext>
+            </a:extLst>
+          </p:cNvPr>
+          <p:cNvSpPr/>
+          <p:nvPr/>
+        </p:nvSpPr>
+        <p:spPr>
+          <a:xfrm>
+            <a:off x="162558" y="73794"/>
+            <a:ext cx="785303" cy="755583"/>
+          </a:xfrm>
+          <a:prstGeom prst="ellipse">
+            <a:avLst/>
+          </a:prstGeom>
+        </p:spPr>
+        <p:style>
+          <a:lnRef idx="2">
+            <a:schemeClr val="accent1">
+              <a:shade val="15000"/>
+            </a:schemeClr>
+          </a:lnRef>
+          <a:fillRef idx="1">
+            <a:schemeClr val="accent1"/>
+          </a:fillRef>
+          <a:effectRef idx="0">
+            <a:schemeClr val="accent1"/>
+          </a:effectRef>
+          <a:fontRef idx="minor">
+            <a:schemeClr val="lt1"/>
+          </a:fontRef>
+        </p:style>
+        <p:txBody>
+          <a:bodyPr rtlCol="0" anchor="ctr"/>
+          <a:lstStyle/>
+          <a:p>
+            <a:pPr algn="ctr"/>
+            <a:r>
+              <a:rPr lang="es-ES" b="1" dirty="0"/>
+              <a:t>TA5</a:t>
+            </a:r>
+          </a:p>
+        </p:txBody>
+      </p:sp>
+      <p:sp>
+        <p:nvSpPr>
+          <p:cNvPr id="5" name="CuadroTexto 4">
+            <a:extLst>
+              <a:ext uri="{FF2B5EF4-FFF2-40B4-BE49-F238E27FC236}">
+                <a16:creationId xmlns:a16="http://schemas.microsoft.com/office/drawing/2014/main" id="{8E688A00-FC40-0CBE-A6C7-9F3A3F422D1D}"/>
+              </a:ext>
+            </a:extLst>
+          </p:cNvPr>
+          <p:cNvSpPr txBox="1"/>
+          <p:nvPr/>
+        </p:nvSpPr>
+        <p:spPr>
+          <a:xfrm>
+            <a:off x="184329" y="1006290"/>
+            <a:ext cx="6751426" cy="2339102"/>
+          </a:xfrm>
+          <a:prstGeom prst="rect">
+            <a:avLst/>
+          </a:prstGeom>
+          <a:noFill/>
+          <a:ln>
+            <a:solidFill>
+              <a:schemeClr val="tx1"/>
+            </a:solidFill>
+            <a:prstDash val="lgDash"/>
+          </a:ln>
+        </p:spPr>
+        <p:txBody>
+          <a:bodyPr wrap="square" rtlCol="0">
+            <a:spAutoFit/>
+          </a:bodyPr>
+          <a:lstStyle>
+            <a:defPPr>
+              <a:defRPr lang="es-ES"/>
+            </a:defPPr>
+            <a:lvl1pPr algn="ctr">
+              <a:defRPr b="1"/>
+            </a:lvl1pPr>
+          </a:lstStyle>
+          <a:p>
+            <a:r>
+              <a:rPr lang="es-ES" sz="2000" dirty="0" err="1"/>
+              <a:t>String</a:t>
+            </a:r>
+            <a:r>
+              <a:rPr lang="es-ES" sz="2000" dirty="0"/>
+              <a:t> a valor numérico</a:t>
+            </a:r>
+          </a:p>
+          <a:p>
+            <a:endParaRPr lang="es-ES" dirty="0"/>
+          </a:p>
+          <a:p>
+            <a:r>
+              <a:rPr lang="es-ES" b="0" dirty="0" err="1">
+                <a:latin typeface="Courier New" panose="02070309020205020404" pitchFamily="49" charset="0"/>
+              </a:rPr>
+              <a:t>String</a:t>
+            </a:r>
+            <a:r>
+              <a:rPr lang="es-ES" b="0" dirty="0">
+                <a:latin typeface="Courier New" panose="02070309020205020404" pitchFamily="49" charset="0"/>
+              </a:rPr>
+              <a:t> </a:t>
+            </a:r>
+            <a:r>
+              <a:rPr lang="es-ES" b="0" dirty="0" err="1">
+                <a:latin typeface="Courier New" panose="02070309020205020404" pitchFamily="49" charset="0"/>
+              </a:rPr>
+              <a:t>aINTRO</a:t>
+            </a:r>
+            <a:r>
+              <a:rPr lang="es-ES" b="0" dirty="0">
+                <a:latin typeface="Courier New" panose="02070309020205020404" pitchFamily="49" charset="0"/>
+              </a:rPr>
+              <a:t> = </a:t>
+            </a:r>
+            <a:r>
+              <a:rPr lang="es-ES" b="0" dirty="0" err="1">
+                <a:latin typeface="Courier New" panose="02070309020205020404" pitchFamily="49" charset="0"/>
+              </a:rPr>
+              <a:t>sc.nextLine</a:t>
+            </a:r>
+            <a:r>
+              <a:rPr lang="es-ES" b="0" dirty="0">
+                <a:latin typeface="Courier New" panose="02070309020205020404" pitchFamily="49" charset="0"/>
+              </a:rPr>
+              <a:t>();</a:t>
+            </a:r>
+          </a:p>
+          <a:p>
+            <a:r>
+              <a:rPr lang="es-ES" b="0" i="1" dirty="0">
+                <a:latin typeface="Courier New" panose="02070309020205020404" pitchFamily="49" charset="0"/>
+              </a:rPr>
+              <a:t>Ej.: </a:t>
+            </a:r>
+            <a:r>
+              <a:rPr lang="es-ES" b="0" i="1" dirty="0" err="1">
+                <a:latin typeface="Courier New" panose="02070309020205020404" pitchFamily="49" charset="0"/>
+              </a:rPr>
+              <a:t>entry</a:t>
+            </a:r>
+            <a:r>
+              <a:rPr lang="es-ES" b="0" i="1" dirty="0">
+                <a:latin typeface="Courier New" panose="02070309020205020404" pitchFamily="49" charset="0"/>
+              </a:rPr>
+              <a:t> por consola</a:t>
+            </a:r>
+            <a:endParaRPr lang="es-ES" i="1" dirty="0">
+              <a:latin typeface="Courier New" panose="02070309020205020404" pitchFamily="49" charset="0"/>
+            </a:endParaRPr>
+          </a:p>
+          <a:p>
+            <a:endParaRPr lang="es-ES" dirty="0">
+              <a:latin typeface="Courier New" panose="02070309020205020404" pitchFamily="49" charset="0"/>
+            </a:endParaRPr>
+          </a:p>
+          <a:p>
+            <a:pPr algn="l"/>
+            <a:r>
+              <a:rPr lang="es-ES" b="0" dirty="0" err="1">
+                <a:latin typeface="Courier New" panose="02070309020205020404" pitchFamily="49" charset="0"/>
+              </a:rPr>
+              <a:t>int</a:t>
+            </a:r>
+            <a:r>
+              <a:rPr lang="es-ES" b="0" dirty="0">
+                <a:latin typeface="Courier New" panose="02070309020205020404" pitchFamily="49" charset="0"/>
+              </a:rPr>
+              <a:t> a = </a:t>
+            </a:r>
+            <a:r>
+              <a:rPr lang="es-ES" b="0" dirty="0" err="1">
+                <a:latin typeface="Courier New" panose="02070309020205020404" pitchFamily="49" charset="0"/>
+              </a:rPr>
+              <a:t>Integer.parseInt</a:t>
+            </a:r>
+            <a:r>
+              <a:rPr lang="es-ES" b="0" dirty="0">
+                <a:latin typeface="Courier New" panose="02070309020205020404" pitchFamily="49" charset="0"/>
+              </a:rPr>
+              <a:t>(</a:t>
+            </a:r>
+            <a:r>
+              <a:rPr lang="es-ES" b="0" dirty="0" err="1">
+                <a:latin typeface="Courier New" panose="02070309020205020404" pitchFamily="49" charset="0"/>
+              </a:rPr>
+              <a:t>aINTRO</a:t>
+            </a:r>
+            <a:r>
+              <a:rPr lang="es-ES" b="0" dirty="0">
+                <a:latin typeface="Courier New" panose="02070309020205020404" pitchFamily="49" charset="0"/>
+              </a:rPr>
+              <a:t>); </a:t>
+            </a:r>
+            <a:r>
+              <a:rPr lang="es-ES" b="0" i="1" dirty="0">
+                <a:latin typeface="Courier New" panose="02070309020205020404" pitchFamily="49" charset="0"/>
+              </a:rPr>
+              <a:t>entero</a:t>
+            </a:r>
+          </a:p>
+          <a:p>
+            <a:pPr algn="l"/>
+            <a:r>
+              <a:rPr lang="fr-FR" b="0" dirty="0">
+                <a:latin typeface="Courier New" panose="02070309020205020404" pitchFamily="49" charset="0"/>
+              </a:rPr>
+              <a:t>double a = </a:t>
+            </a:r>
+            <a:r>
+              <a:rPr lang="fr-FR" b="0" dirty="0" err="1">
+                <a:latin typeface="Courier New" panose="02070309020205020404" pitchFamily="49" charset="0"/>
+              </a:rPr>
+              <a:t>Double.parseDouble</a:t>
+            </a:r>
+            <a:r>
+              <a:rPr lang="fr-FR" b="0" dirty="0">
+                <a:latin typeface="Courier New" panose="02070309020205020404" pitchFamily="49" charset="0"/>
+              </a:rPr>
+              <a:t>(</a:t>
+            </a:r>
+            <a:r>
+              <a:rPr lang="fr-FR" b="0" dirty="0" err="1">
+                <a:latin typeface="Courier New" panose="02070309020205020404" pitchFamily="49" charset="0"/>
+              </a:rPr>
+              <a:t>aINTRO</a:t>
+            </a:r>
+            <a:r>
+              <a:rPr lang="fr-FR" b="0" dirty="0">
+                <a:latin typeface="Courier New" panose="02070309020205020404" pitchFamily="49" charset="0"/>
+              </a:rPr>
+              <a:t>);</a:t>
+            </a:r>
+            <a:r>
+              <a:rPr lang="fr-FR" b="0" i="1" dirty="0" err="1">
+                <a:latin typeface="Courier New" panose="02070309020205020404" pitchFamily="49" charset="0"/>
+              </a:rPr>
+              <a:t>decimal</a:t>
+            </a:r>
+            <a:endParaRPr lang="fr-FR" b="0" i="1" dirty="0">
+              <a:latin typeface="Courier New" panose="02070309020205020404" pitchFamily="49" charset="0"/>
+            </a:endParaRPr>
+          </a:p>
+          <a:p>
+            <a:pPr algn="l"/>
+            <a:r>
+              <a:rPr lang="fr-FR" b="0" dirty="0">
+                <a:latin typeface="Courier New" panose="02070309020205020404" pitchFamily="49" charset="0"/>
+              </a:rPr>
+              <a:t>long/short/byte/</a:t>
+            </a:r>
+            <a:r>
+              <a:rPr lang="fr-FR" b="0" dirty="0" err="1">
+                <a:latin typeface="Courier New" panose="02070309020205020404" pitchFamily="49" charset="0"/>
+              </a:rPr>
+              <a:t>float</a:t>
+            </a:r>
+            <a:r>
+              <a:rPr lang="fr-FR" b="0" dirty="0">
+                <a:latin typeface="Courier New" panose="02070309020205020404" pitchFamily="49" charset="0"/>
+              </a:rPr>
+              <a:t> a = l….</a:t>
+            </a:r>
+            <a:r>
+              <a:rPr lang="fr-FR" b="0" dirty="0" err="1">
+                <a:latin typeface="Courier New" panose="02070309020205020404" pitchFamily="49" charset="0"/>
+              </a:rPr>
+              <a:t>parseL</a:t>
+            </a:r>
+            <a:r>
+              <a:rPr lang="fr-FR" b="0" dirty="0">
+                <a:latin typeface="Courier New" panose="02070309020205020404" pitchFamily="49" charset="0"/>
+              </a:rPr>
+              <a:t>…(</a:t>
+            </a:r>
+            <a:r>
+              <a:rPr lang="fr-FR" b="0" dirty="0" err="1">
+                <a:latin typeface="Courier New" panose="02070309020205020404" pitchFamily="49" charset="0"/>
+              </a:rPr>
+              <a:t>aIntro</a:t>
+            </a:r>
+            <a:r>
+              <a:rPr lang="fr-FR" b="0" dirty="0">
+                <a:latin typeface="Courier New" panose="02070309020205020404" pitchFamily="49" charset="0"/>
+              </a:rPr>
+              <a:t>);</a:t>
+            </a:r>
+            <a:endParaRPr lang="es-ES" b="0" dirty="0">
+              <a:latin typeface="Courier New" panose="02070309020205020404" pitchFamily="49" charset="0"/>
+            </a:endParaRPr>
+          </a:p>
+        </p:txBody>
+      </p:sp>
+      <p:sp>
+        <p:nvSpPr>
+          <p:cNvPr id="8" name="CuadroTexto 7">
+            <a:extLst>
+              <a:ext uri="{FF2B5EF4-FFF2-40B4-BE49-F238E27FC236}">
+                <a16:creationId xmlns:a16="http://schemas.microsoft.com/office/drawing/2014/main" id="{EFB372BE-F1D4-24C6-2B1D-B5261498C41C}"/>
+              </a:ext>
+            </a:extLst>
+          </p:cNvPr>
+          <p:cNvSpPr txBox="1"/>
+          <p:nvPr/>
+        </p:nvSpPr>
+        <p:spPr>
+          <a:xfrm>
+            <a:off x="162558" y="3567610"/>
+            <a:ext cx="7236618" cy="2616101"/>
+          </a:xfrm>
+          <a:prstGeom prst="rect">
+            <a:avLst/>
+          </a:prstGeom>
+          <a:noFill/>
+          <a:ln>
+            <a:solidFill>
+              <a:schemeClr val="tx1"/>
+            </a:solidFill>
+            <a:prstDash val="lgDash"/>
+          </a:ln>
+        </p:spPr>
+        <p:txBody>
+          <a:bodyPr wrap="square" rtlCol="0">
+            <a:spAutoFit/>
+          </a:bodyPr>
+          <a:lstStyle>
+            <a:defPPr>
+              <a:defRPr lang="es-ES"/>
+            </a:defPPr>
+            <a:lvl1pPr algn="ctr">
+              <a:defRPr b="1"/>
+            </a:lvl1pPr>
+          </a:lstStyle>
+          <a:p>
+            <a:r>
+              <a:rPr lang="es-ES" sz="2000" dirty="0"/>
+              <a:t>Modificar formato </a:t>
+            </a:r>
+            <a:r>
+              <a:rPr lang="es-ES" sz="2000" dirty="0" err="1"/>
+              <a:t>String</a:t>
+            </a:r>
+            <a:endParaRPr lang="es-ES" sz="2000" dirty="0"/>
+          </a:p>
+          <a:p>
+            <a:endParaRPr lang="es-ES" dirty="0"/>
+          </a:p>
+          <a:p>
+            <a:pPr algn="l"/>
+            <a:r>
+              <a:rPr lang="es-ES" b="0" dirty="0">
+                <a:effectLst/>
+                <a:latin typeface="Courier New" panose="02070309020205020404" pitchFamily="49" charset="0"/>
+              </a:rPr>
+              <a:t>cadena = </a:t>
+            </a:r>
+            <a:r>
+              <a:rPr lang="es-ES" b="0" dirty="0" err="1">
+                <a:effectLst/>
+                <a:latin typeface="Courier New" panose="02070309020205020404" pitchFamily="49" charset="0"/>
+              </a:rPr>
+              <a:t>cadena.toUpperCase</a:t>
+            </a:r>
+            <a:r>
+              <a:rPr lang="es-ES" b="0" dirty="0">
+                <a:effectLst/>
+                <a:latin typeface="Courier New" panose="02070309020205020404" pitchFamily="49" charset="0"/>
+              </a:rPr>
+              <a:t>(); </a:t>
+            </a:r>
+            <a:r>
+              <a:rPr lang="es-ES" b="0" i="1" dirty="0" err="1">
+                <a:effectLst/>
+                <a:latin typeface="Courier New" panose="02070309020205020404" pitchFamily="49" charset="0"/>
+              </a:rPr>
+              <a:t>caps</a:t>
+            </a:r>
+            <a:endParaRPr lang="es-ES" b="0" i="1" dirty="0">
+              <a:effectLst/>
+              <a:latin typeface="Courier New" panose="02070309020205020404" pitchFamily="49" charset="0"/>
+            </a:endParaRPr>
+          </a:p>
+          <a:p>
+            <a:pPr algn="l"/>
+            <a:r>
+              <a:rPr lang="es-ES" b="0" dirty="0">
+                <a:effectLst/>
+                <a:latin typeface="Courier New" panose="02070309020205020404" pitchFamily="49" charset="0"/>
+              </a:rPr>
+              <a:t>cadena = </a:t>
+            </a:r>
+            <a:r>
+              <a:rPr lang="es-ES" b="0" dirty="0" err="1">
+                <a:effectLst/>
+                <a:latin typeface="Courier New" panose="02070309020205020404" pitchFamily="49" charset="0"/>
+              </a:rPr>
+              <a:t>cadena.toLowerCase</a:t>
+            </a:r>
+            <a:r>
+              <a:rPr lang="es-ES" b="0" dirty="0">
+                <a:effectLst/>
+                <a:latin typeface="Courier New" panose="02070309020205020404" pitchFamily="49" charset="0"/>
+              </a:rPr>
+              <a:t>(); </a:t>
+            </a:r>
+            <a:r>
+              <a:rPr lang="es-ES" b="0" i="1" dirty="0" err="1">
+                <a:effectLst/>
+                <a:latin typeface="Courier New" panose="02070309020205020404" pitchFamily="49" charset="0"/>
+              </a:rPr>
+              <a:t>low</a:t>
+            </a:r>
+            <a:endParaRPr lang="es-ES" b="0" i="1" dirty="0">
+              <a:effectLst/>
+              <a:latin typeface="Courier New" panose="02070309020205020404" pitchFamily="49" charset="0"/>
+            </a:endParaRPr>
+          </a:p>
+          <a:p>
+            <a:pPr algn="l"/>
+            <a:r>
+              <a:rPr lang="es-ES" sz="1800" b="0" dirty="0">
+                <a:effectLst/>
+                <a:latin typeface="Courier New" panose="02070309020205020404" pitchFamily="49" charset="0"/>
+              </a:rPr>
+              <a:t>cadena = </a:t>
+            </a:r>
+            <a:r>
+              <a:rPr lang="es-ES" sz="1800" b="0" dirty="0" err="1">
+                <a:effectLst/>
+                <a:latin typeface="Courier New" panose="02070309020205020404" pitchFamily="49" charset="0"/>
+              </a:rPr>
+              <a:t>cadena.trim</a:t>
+            </a:r>
+            <a:r>
+              <a:rPr lang="es-ES" sz="1800" b="0" dirty="0">
+                <a:effectLst/>
+                <a:latin typeface="Courier New" panose="02070309020205020404" pitchFamily="49" charset="0"/>
+              </a:rPr>
+              <a:t>(); </a:t>
+            </a:r>
+            <a:r>
+              <a:rPr lang="es-ES" sz="1800" b="0" i="1" dirty="0">
+                <a:effectLst/>
+                <a:latin typeface="Courier New" panose="02070309020205020404" pitchFamily="49" charset="0"/>
+              </a:rPr>
+              <a:t>elimina espacios en blanco</a:t>
+            </a:r>
+          </a:p>
+          <a:p>
+            <a:pPr algn="l"/>
+            <a:r>
+              <a:rPr lang="es-ES" b="0" dirty="0" err="1">
+                <a:latin typeface="Courier New" panose="02070309020205020404" pitchFamily="49" charset="0"/>
+              </a:rPr>
+              <a:t>newCadena</a:t>
+            </a:r>
+            <a:r>
+              <a:rPr lang="es-ES" b="0" dirty="0">
+                <a:latin typeface="Courier New" panose="02070309020205020404" pitchFamily="49" charset="0"/>
+              </a:rPr>
+              <a:t> = </a:t>
+            </a:r>
+            <a:r>
+              <a:rPr lang="es-ES" b="0" dirty="0" err="1">
+                <a:latin typeface="Courier New" panose="02070309020205020404" pitchFamily="49" charset="0"/>
+              </a:rPr>
+              <a:t>cadena.replace</a:t>
+            </a:r>
+            <a:r>
+              <a:rPr lang="es-ES" b="0" dirty="0">
+                <a:latin typeface="Courier New" panose="02070309020205020404" pitchFamily="49" charset="0"/>
+              </a:rPr>
+              <a:t>(‘</a:t>
+            </a:r>
+            <a:r>
+              <a:rPr lang="es-ES" b="0" dirty="0" err="1">
+                <a:latin typeface="Courier New" panose="02070309020205020404" pitchFamily="49" charset="0"/>
+              </a:rPr>
+              <a:t>a’,’b</a:t>
+            </a:r>
+            <a:r>
+              <a:rPr lang="es-ES" b="0" dirty="0">
+                <a:latin typeface="Courier New" panose="02070309020205020404" pitchFamily="49" charset="0"/>
+              </a:rPr>
+              <a:t>’); </a:t>
+            </a:r>
+            <a:r>
+              <a:rPr lang="es-ES" b="0" i="1" dirty="0">
+                <a:latin typeface="Courier New" panose="02070309020205020404" pitchFamily="49" charset="0"/>
+              </a:rPr>
+              <a:t>a </a:t>
+            </a:r>
+            <a:r>
+              <a:rPr lang="es-ES" b="0" i="1" dirty="0">
+                <a:latin typeface="Courier New" panose="02070309020205020404" pitchFamily="49" charset="0"/>
+                <a:sym typeface="Wingdings" panose="05000000000000000000" pitchFamily="2" charset="2"/>
+              </a:rPr>
+              <a:t> b</a:t>
+            </a:r>
+          </a:p>
+          <a:p>
+            <a:pPr algn="l"/>
+            <a:r>
+              <a:rPr lang="es-ES" b="0" dirty="0" err="1">
+                <a:latin typeface="Courier New" panose="02070309020205020404" pitchFamily="49" charset="0"/>
+              </a:rPr>
+              <a:t>newCadena</a:t>
+            </a:r>
+            <a:r>
+              <a:rPr lang="es-ES" b="0" dirty="0">
+                <a:latin typeface="Courier New" panose="02070309020205020404" pitchFamily="49" charset="0"/>
+              </a:rPr>
+              <a:t> = </a:t>
+            </a:r>
+            <a:r>
+              <a:rPr lang="es-ES" b="0" dirty="0" err="1">
+                <a:latin typeface="Courier New" panose="02070309020205020404" pitchFamily="49" charset="0"/>
+              </a:rPr>
+              <a:t>cadena.replaceAll</a:t>
+            </a:r>
+            <a:r>
+              <a:rPr lang="es-ES" b="0" dirty="0">
+                <a:latin typeface="Courier New" panose="02070309020205020404" pitchFamily="49" charset="0"/>
+              </a:rPr>
+              <a:t>(‘hi’,’</a:t>
+            </a:r>
+            <a:r>
+              <a:rPr lang="es-ES" b="0" dirty="0" err="1">
+                <a:latin typeface="Courier New" panose="02070309020205020404" pitchFamily="49" charset="0"/>
+              </a:rPr>
+              <a:t>bye</a:t>
+            </a:r>
+            <a:r>
+              <a:rPr lang="es-ES" b="0" dirty="0">
+                <a:latin typeface="Courier New" panose="02070309020205020404" pitchFamily="49" charset="0"/>
+              </a:rPr>
+              <a:t>’); </a:t>
+            </a:r>
+            <a:r>
+              <a:rPr lang="es-ES" b="0" i="1" dirty="0">
+                <a:latin typeface="Courier New" panose="02070309020205020404" pitchFamily="49" charset="0"/>
+              </a:rPr>
+              <a:t>hi </a:t>
+            </a:r>
+            <a:r>
+              <a:rPr lang="es-ES" b="0" i="1" dirty="0">
+                <a:latin typeface="Courier New" panose="02070309020205020404" pitchFamily="49" charset="0"/>
+                <a:sym typeface="Wingdings" panose="05000000000000000000" pitchFamily="2" charset="2"/>
+              </a:rPr>
+              <a:t> </a:t>
+            </a:r>
+            <a:r>
+              <a:rPr lang="es-ES" b="0" i="1" dirty="0" err="1">
+                <a:latin typeface="Courier New" panose="02070309020205020404" pitchFamily="49" charset="0"/>
+                <a:sym typeface="Wingdings" panose="05000000000000000000" pitchFamily="2" charset="2"/>
+              </a:rPr>
+              <a:t>bye</a:t>
+            </a:r>
+            <a:endParaRPr lang="es-ES" b="0" i="1" dirty="0">
+              <a:latin typeface="Courier New" panose="02070309020205020404" pitchFamily="49" charset="0"/>
+              <a:sym typeface="Wingdings" panose="05000000000000000000" pitchFamily="2" charset="2"/>
+            </a:endParaRPr>
+          </a:p>
+          <a:p>
+            <a:pPr algn="l"/>
+            <a:r>
+              <a:rPr lang="es-ES" b="0" dirty="0" err="1">
+                <a:latin typeface="Courier New" panose="02070309020205020404" pitchFamily="49" charset="0"/>
+                <a:sym typeface="Wingdings" panose="05000000000000000000" pitchFamily="2" charset="2"/>
+              </a:rPr>
+              <a:t>halfCadena</a:t>
+            </a:r>
+            <a:r>
+              <a:rPr lang="es-ES" b="0" dirty="0">
+                <a:latin typeface="Courier New" panose="02070309020205020404" pitchFamily="49" charset="0"/>
+                <a:sym typeface="Wingdings" panose="05000000000000000000" pitchFamily="2" charset="2"/>
+              </a:rPr>
+              <a:t> = </a:t>
+            </a:r>
+            <a:r>
+              <a:rPr lang="es-ES" b="0" dirty="0" err="1">
+                <a:latin typeface="Courier New" panose="02070309020205020404" pitchFamily="49" charset="0"/>
+                <a:sym typeface="Wingdings" panose="05000000000000000000" pitchFamily="2" charset="2"/>
+              </a:rPr>
+              <a:t>cadena.split</a:t>
+            </a:r>
+            <a:r>
+              <a:rPr lang="es-ES" b="0" dirty="0">
+                <a:latin typeface="Courier New" panose="02070309020205020404" pitchFamily="49" charset="0"/>
+                <a:sym typeface="Wingdings" panose="05000000000000000000" pitchFamily="2" charset="2"/>
+              </a:rPr>
+              <a:t>(”,”); </a:t>
+            </a:r>
+            <a:r>
+              <a:rPr lang="es-ES" b="0" i="1" dirty="0">
+                <a:latin typeface="Courier New" panose="02070309020205020404" pitchFamily="49" charset="0"/>
+                <a:sym typeface="Wingdings" panose="05000000000000000000" pitchFamily="2" charset="2"/>
+              </a:rPr>
+              <a:t>comas  ENTER</a:t>
+            </a:r>
+          </a:p>
+          <a:p>
+            <a:pPr algn="l"/>
+            <a:endParaRPr lang="es-ES" b="0" dirty="0">
+              <a:latin typeface="Courier New" panose="02070309020205020404" pitchFamily="49" charset="0"/>
+            </a:endParaRPr>
+          </a:p>
+        </p:txBody>
+      </p:sp>
+      <p:sp>
+        <p:nvSpPr>
+          <p:cNvPr id="10" name="CuadroTexto 9">
+            <a:extLst>
+              <a:ext uri="{FF2B5EF4-FFF2-40B4-BE49-F238E27FC236}">
+                <a16:creationId xmlns:a16="http://schemas.microsoft.com/office/drawing/2014/main" id="{3405A794-937B-5400-82F0-314D87AADA8C}"/>
+              </a:ext>
+            </a:extLst>
+          </p:cNvPr>
+          <p:cNvSpPr txBox="1"/>
+          <p:nvPr/>
+        </p:nvSpPr>
+        <p:spPr>
+          <a:xfrm>
+            <a:off x="7520474" y="73794"/>
+            <a:ext cx="4415662" cy="3477875"/>
+          </a:xfrm>
+          <a:prstGeom prst="rect">
+            <a:avLst/>
+          </a:prstGeom>
+          <a:noFill/>
+          <a:ln>
+            <a:solidFill>
+              <a:schemeClr val="tx1"/>
+            </a:solidFill>
+            <a:prstDash val="lgDash"/>
+          </a:ln>
+        </p:spPr>
+        <p:txBody>
+          <a:bodyPr wrap="square" rtlCol="0">
+            <a:spAutoFit/>
+          </a:bodyPr>
+          <a:lstStyle>
+            <a:defPPr>
+              <a:defRPr lang="es-ES"/>
+            </a:defPPr>
+            <a:lvl1pPr algn="ctr">
+              <a:defRPr b="1"/>
+            </a:lvl1pPr>
+          </a:lstStyle>
+          <a:p>
+            <a:r>
+              <a:rPr lang="es-ES" sz="2000" dirty="0"/>
+              <a:t>Desglosar/Unir </a:t>
+            </a:r>
+            <a:r>
+              <a:rPr lang="es-ES" sz="2000" dirty="0" err="1"/>
+              <a:t>String</a:t>
+            </a:r>
+            <a:endParaRPr lang="es-ES" sz="2000" dirty="0"/>
+          </a:p>
+          <a:p>
+            <a:endParaRPr lang="es-ES" sz="2000" dirty="0"/>
+          </a:p>
+          <a:p>
+            <a:r>
+              <a:rPr lang="es-ES" b="0" dirty="0" err="1">
+                <a:latin typeface="Courier New" panose="02070309020205020404" pitchFamily="49" charset="0"/>
+              </a:rPr>
+              <a:t>String</a:t>
+            </a:r>
+            <a:r>
+              <a:rPr lang="es-ES" b="0" dirty="0">
+                <a:latin typeface="Courier New" panose="02070309020205020404" pitchFamily="49" charset="0"/>
+              </a:rPr>
+              <a:t> </a:t>
+            </a:r>
+            <a:r>
+              <a:rPr lang="es-ES" b="0" dirty="0" err="1">
+                <a:latin typeface="Courier New" panose="02070309020205020404" pitchFamily="49" charset="0"/>
+              </a:rPr>
+              <a:t>subCadena</a:t>
+            </a:r>
+            <a:r>
+              <a:rPr lang="es-ES" b="0" dirty="0">
+                <a:latin typeface="Courier New" panose="02070309020205020404" pitchFamily="49" charset="0"/>
+              </a:rPr>
+              <a:t> = </a:t>
+            </a:r>
+            <a:r>
+              <a:rPr lang="es-ES" b="0" dirty="0" err="1">
+                <a:latin typeface="Courier New" panose="02070309020205020404" pitchFamily="49" charset="0"/>
+              </a:rPr>
+              <a:t>cadena.substring</a:t>
+            </a:r>
+            <a:r>
+              <a:rPr lang="es-ES" b="0" dirty="0">
+                <a:latin typeface="Courier New" panose="02070309020205020404" pitchFamily="49" charset="0"/>
+              </a:rPr>
+              <a:t>(</a:t>
+            </a:r>
+            <a:r>
+              <a:rPr lang="es-ES" b="0" dirty="0" err="1">
+                <a:latin typeface="Courier New" panose="02070309020205020404" pitchFamily="49" charset="0"/>
+              </a:rPr>
+              <a:t>x,y</a:t>
+            </a:r>
+            <a:r>
+              <a:rPr lang="es-ES" b="0" dirty="0">
+                <a:latin typeface="Courier New" panose="02070309020205020404" pitchFamily="49" charset="0"/>
+              </a:rPr>
+              <a:t>);</a:t>
+            </a:r>
+          </a:p>
+          <a:p>
+            <a:r>
+              <a:rPr lang="es-ES" b="0" i="1" dirty="0">
+                <a:effectLst/>
+                <a:latin typeface="Courier New" panose="02070309020205020404" pitchFamily="49" charset="0"/>
+              </a:rPr>
+              <a:t>Extraer </a:t>
+            </a:r>
+            <a:r>
+              <a:rPr lang="es-ES" b="0" i="1" dirty="0" err="1">
+                <a:effectLst/>
+                <a:latin typeface="Courier New" panose="02070309020205020404" pitchFamily="49" charset="0"/>
+              </a:rPr>
+              <a:t>subString</a:t>
+            </a:r>
+            <a:endParaRPr lang="es-ES" b="0" i="1" dirty="0">
+              <a:effectLst/>
+              <a:latin typeface="Courier New" panose="02070309020205020404" pitchFamily="49" charset="0"/>
+            </a:endParaRPr>
+          </a:p>
+          <a:p>
+            <a:endParaRPr lang="es-ES" b="0" dirty="0">
+              <a:latin typeface="Courier New" panose="02070309020205020404" pitchFamily="49" charset="0"/>
+            </a:endParaRPr>
+          </a:p>
+          <a:p>
+            <a:r>
+              <a:rPr lang="es-ES" b="0" dirty="0">
+                <a:latin typeface="Courier New" panose="02070309020205020404" pitchFamily="49" charset="0"/>
+              </a:rPr>
+              <a:t>cad1 = “Hola”;</a:t>
+            </a:r>
+          </a:p>
+          <a:p>
+            <a:r>
+              <a:rPr lang="es-ES" b="0" dirty="0">
+                <a:latin typeface="Courier New" panose="02070309020205020404" pitchFamily="49" charset="0"/>
+              </a:rPr>
+              <a:t>cad2 = “mundo”</a:t>
+            </a:r>
+          </a:p>
+          <a:p>
+            <a:r>
+              <a:rPr lang="es-ES" b="0" i="1" dirty="0">
+                <a:latin typeface="Courier New" panose="02070309020205020404" pitchFamily="49" charset="0"/>
+              </a:rPr>
+              <a:t>Concatenar</a:t>
+            </a:r>
+            <a:endParaRPr lang="es-ES" b="0" dirty="0">
+              <a:latin typeface="Courier New" panose="02070309020205020404" pitchFamily="49" charset="0"/>
+            </a:endParaRPr>
+          </a:p>
+          <a:p>
+            <a:r>
+              <a:rPr lang="es-ES" b="0" dirty="0" err="1">
+                <a:latin typeface="Courier New" panose="02070309020205020404" pitchFamily="49" charset="0"/>
+              </a:rPr>
+              <a:t>String</a:t>
+            </a:r>
+            <a:r>
+              <a:rPr lang="es-ES" b="0" dirty="0">
+                <a:latin typeface="Courier New" panose="02070309020205020404" pitchFamily="49" charset="0"/>
+              </a:rPr>
+              <a:t> frase =</a:t>
+            </a:r>
+          </a:p>
+          <a:p>
+            <a:r>
+              <a:rPr lang="es-ES" b="0" dirty="0">
+                <a:latin typeface="Courier New" panose="02070309020205020404" pitchFamily="49" charset="0"/>
+              </a:rPr>
+              <a:t>cad1.concat(“, ”).</a:t>
+            </a:r>
+            <a:r>
+              <a:rPr lang="es-ES" b="0" dirty="0" err="1">
+                <a:latin typeface="Courier New" panose="02070309020205020404" pitchFamily="49" charset="0"/>
+              </a:rPr>
+              <a:t>concat</a:t>
+            </a:r>
+            <a:r>
+              <a:rPr lang="es-ES" b="0" dirty="0">
+                <a:latin typeface="Courier New" panose="02070309020205020404" pitchFamily="49" charset="0"/>
+              </a:rPr>
+              <a:t>(cad2);</a:t>
+            </a:r>
+          </a:p>
+          <a:p>
+            <a:pPr marL="285750" indent="-285750">
+              <a:buFont typeface="Wingdings" panose="05000000000000000000" pitchFamily="2" charset="2"/>
+              <a:buChar char="à"/>
+            </a:pPr>
+            <a:r>
+              <a:rPr lang="es-ES" b="0" dirty="0">
+                <a:latin typeface="Courier New" panose="02070309020205020404" pitchFamily="49" charset="0"/>
+                <a:sym typeface="Wingdings" panose="05000000000000000000" pitchFamily="2" charset="2"/>
+              </a:rPr>
+              <a:t>Hola, mundo</a:t>
+            </a:r>
+            <a:endParaRPr lang="es-ES" b="0" dirty="0">
+              <a:latin typeface="Courier New" panose="02070309020205020404" pitchFamily="49" charset="0"/>
+            </a:endParaRPr>
+          </a:p>
+        </p:txBody>
+      </p:sp>
+      <p:sp>
+        <p:nvSpPr>
+          <p:cNvPr id="14" name="CuadroTexto 13">
+            <a:extLst>
+              <a:ext uri="{FF2B5EF4-FFF2-40B4-BE49-F238E27FC236}">
+                <a16:creationId xmlns:a16="http://schemas.microsoft.com/office/drawing/2014/main" id="{EF49F2EF-94CE-1B8E-2A5A-2E71E98FEA8B}"/>
+              </a:ext>
+            </a:extLst>
+          </p:cNvPr>
+          <p:cNvSpPr txBox="1"/>
+          <p:nvPr/>
+        </p:nvSpPr>
+        <p:spPr>
+          <a:xfrm>
+            <a:off x="7520474" y="3685658"/>
+            <a:ext cx="4415662" cy="2893100"/>
+          </a:xfrm>
+          <a:prstGeom prst="rect">
+            <a:avLst/>
+          </a:prstGeom>
+          <a:noFill/>
+          <a:ln>
+            <a:solidFill>
+              <a:schemeClr val="tx1"/>
+            </a:solidFill>
+            <a:prstDash val="lgDash"/>
+          </a:ln>
+        </p:spPr>
+        <p:txBody>
+          <a:bodyPr wrap="square" rtlCol="0">
+            <a:spAutoFit/>
+          </a:bodyPr>
+          <a:lstStyle>
+            <a:defPPr>
+              <a:defRPr lang="es-ES"/>
+            </a:defPPr>
+            <a:lvl1pPr algn="ctr">
+              <a:defRPr b="1"/>
+            </a:lvl1pPr>
+          </a:lstStyle>
+          <a:p>
+            <a:r>
+              <a:rPr lang="es-ES" sz="2000" dirty="0"/>
+              <a:t>Buscar en </a:t>
+            </a:r>
+            <a:r>
+              <a:rPr lang="es-ES" sz="2000" dirty="0" err="1"/>
+              <a:t>String</a:t>
+            </a:r>
+            <a:endParaRPr lang="es-ES" sz="2000" dirty="0"/>
+          </a:p>
+          <a:p>
+            <a:r>
+              <a:rPr lang="es-ES" b="0" dirty="0" err="1">
+                <a:latin typeface="Courier New" panose="02070309020205020404" pitchFamily="49" charset="0"/>
+              </a:rPr>
+              <a:t>String</a:t>
+            </a:r>
+            <a:r>
+              <a:rPr lang="es-ES" b="0" dirty="0">
+                <a:latin typeface="Courier New" panose="02070309020205020404" pitchFamily="49" charset="0"/>
+              </a:rPr>
+              <a:t> cadena = “coche rojo”;</a:t>
+            </a:r>
+          </a:p>
+          <a:p>
+            <a:r>
+              <a:rPr lang="es-ES" b="0" dirty="0" err="1">
+                <a:latin typeface="Courier New" panose="02070309020205020404" pitchFamily="49" charset="0"/>
+              </a:rPr>
+              <a:t>boolean</a:t>
+            </a:r>
+            <a:r>
+              <a:rPr lang="es-ES" b="0" dirty="0">
+                <a:latin typeface="Courier New" panose="02070309020205020404" pitchFamily="49" charset="0"/>
+              </a:rPr>
+              <a:t> </a:t>
+            </a:r>
+            <a:r>
+              <a:rPr lang="es-ES" b="0" dirty="0" err="1">
+                <a:latin typeface="Courier New" panose="02070309020205020404" pitchFamily="49" charset="0"/>
+              </a:rPr>
+              <a:t>cRojo</a:t>
+            </a:r>
+            <a:r>
+              <a:rPr lang="es-ES" b="0" dirty="0">
+                <a:latin typeface="Courier New" panose="02070309020205020404" pitchFamily="49" charset="0"/>
+              </a:rPr>
+              <a:t> = </a:t>
+            </a:r>
+            <a:r>
+              <a:rPr lang="es-ES" b="0" dirty="0" err="1">
+                <a:latin typeface="Courier New" panose="02070309020205020404" pitchFamily="49" charset="0"/>
+              </a:rPr>
+              <a:t>cadena.contains</a:t>
+            </a:r>
+            <a:r>
+              <a:rPr lang="es-ES" b="0" dirty="0">
+                <a:latin typeface="Courier New" panose="02070309020205020404" pitchFamily="49" charset="0"/>
+              </a:rPr>
+              <a:t>(“rojo”);</a:t>
+            </a:r>
+          </a:p>
+          <a:p>
+            <a:r>
+              <a:rPr lang="es-ES" b="0" i="1" dirty="0">
+                <a:latin typeface="Courier New" panose="02070309020205020404" pitchFamily="49" charset="0"/>
+              </a:rPr>
+              <a:t>Contiene (true) o no (false)</a:t>
+            </a:r>
+          </a:p>
+          <a:p>
+            <a:endParaRPr lang="es-ES" b="0" dirty="0">
+              <a:latin typeface="Courier New" panose="02070309020205020404" pitchFamily="49" charset="0"/>
+            </a:endParaRPr>
+          </a:p>
+          <a:p>
+            <a:r>
+              <a:rPr lang="es-ES" b="0" dirty="0" err="1">
+                <a:latin typeface="Courier New" panose="02070309020205020404" pitchFamily="49" charset="0"/>
+              </a:rPr>
+              <a:t>int</a:t>
+            </a:r>
+            <a:r>
+              <a:rPr lang="es-ES" b="0" dirty="0">
+                <a:latin typeface="Courier New" panose="02070309020205020404" pitchFamily="49" charset="0"/>
+              </a:rPr>
+              <a:t> </a:t>
+            </a:r>
+            <a:r>
+              <a:rPr lang="es-ES" b="0" dirty="0" err="1">
+                <a:latin typeface="Courier New" panose="02070309020205020404" pitchFamily="49" charset="0"/>
+              </a:rPr>
+              <a:t>indice</a:t>
+            </a:r>
+            <a:r>
+              <a:rPr lang="es-ES" b="0" dirty="0">
+                <a:latin typeface="Courier New" panose="02070309020205020404" pitchFamily="49" charset="0"/>
+              </a:rPr>
+              <a:t> = </a:t>
+            </a:r>
+          </a:p>
+          <a:p>
+            <a:r>
+              <a:rPr lang="es-ES" b="0" dirty="0" err="1">
+                <a:latin typeface="Courier New" panose="02070309020205020404" pitchFamily="49" charset="0"/>
+              </a:rPr>
+              <a:t>Cadena.indexOf</a:t>
+            </a:r>
+            <a:r>
+              <a:rPr lang="es-ES" b="0" dirty="0">
+                <a:latin typeface="Courier New" panose="02070309020205020404" pitchFamily="49" charset="0"/>
+              </a:rPr>
+              <a:t>(“coche”);</a:t>
+            </a:r>
+          </a:p>
+          <a:p>
+            <a:r>
+              <a:rPr lang="es-ES" b="0" i="1" dirty="0">
+                <a:latin typeface="Courier New" panose="02070309020205020404" pitchFamily="49" charset="0"/>
+              </a:rPr>
+              <a:t>Posición de la </a:t>
+            </a:r>
+            <a:r>
+              <a:rPr lang="es-ES" b="0" i="1" dirty="0" err="1">
+                <a:latin typeface="Courier New" panose="02070309020205020404" pitchFamily="49" charset="0"/>
+              </a:rPr>
+              <a:t>subcadena</a:t>
+            </a:r>
+            <a:r>
+              <a:rPr lang="es-ES" b="0" i="1" dirty="0">
+                <a:latin typeface="Courier New" panose="02070309020205020404" pitchFamily="49" charset="0"/>
+              </a:rPr>
+              <a:t> buscada</a:t>
+            </a:r>
+            <a:endParaRPr lang="es-ES" b="0" dirty="0">
+              <a:latin typeface="Courier New" panose="02070309020205020404" pitchFamily="49" charset="0"/>
+            </a:endParaRPr>
+          </a:p>
+        </p:txBody>
+      </p:sp>
+    </p:spTree>
+    <p:extLst>
+      <p:ext uri="{BB962C8B-B14F-4D97-AF65-F5344CB8AC3E}">
+        <p14:creationId xmlns:p14="http://schemas.microsoft.com/office/powerpoint/2010/main" val="474959408"/>
+      </p:ext>
+    </p:extLst>
+  </p:cSld>
+  <p:clrMapOvr>
+    <a:masterClrMapping/>
+  </p:clrMapOvr>
+</p:sld>
+</file>
+
+<file path=ppt/slides/slide4.xml><?xml version="1.0" encoding="utf-8"?>
+<p:sld xmlns:a="http://schemas.openxmlformats.org/drawingml/2006/main" xmlns:r="http://schemas.openxmlformats.org/officeDocument/2006/relationships" xmlns:p="http://schemas.openxmlformats.org/presentationml/2006/main">
+  <p:cSld>
+    <p:spTree>
+      <p:nvGrpSpPr>
+        <p:cNvPr id="1" name="">
+          <a:extLst>
+            <a:ext uri="{FF2B5EF4-FFF2-40B4-BE49-F238E27FC236}">
               <a16:creationId xmlns:a16="http://schemas.microsoft.com/office/drawing/2014/main" id="{9871C429-F464-1048-5747-9A667854AA85}"/>
             </a:ext>
           </a:extLst>
@@ -5020,7 +6109,7 @@
 </p:sld>
 </file>
 
-<file path=ppt/slides/slide4.xml><?xml version="1.0" encoding="utf-8"?>
+<file path=ppt/slides/slide5.xml><?xml version="1.0" encoding="utf-8"?>
 <p:sld xmlns:a="http://schemas.openxmlformats.org/drawingml/2006/main" xmlns:r="http://schemas.openxmlformats.org/officeDocument/2006/relationships" xmlns:p="http://schemas.openxmlformats.org/presentationml/2006/main">
   <p:cSld>
     <p:spTree>
@@ -5462,7 +6551,7 @@
 </p:sld>
 </file>
 
-<file path=ppt/slides/slide5.xml><?xml version="1.0" encoding="utf-8"?>
+<file path=ppt/slides/slide6.xml><?xml version="1.0" encoding="utf-8"?>
 <p:sld xmlns:a="http://schemas.openxmlformats.org/drawingml/2006/main" xmlns:r="http://schemas.openxmlformats.org/officeDocument/2006/relationships" xmlns:p="http://schemas.openxmlformats.org/presentationml/2006/main">
   <p:cSld>
     <p:spTree>
@@ -5724,7 +6813,7 @@
 </p:sld>
 </file>
 
-<file path=ppt/slides/slide6.xml><?xml version="1.0" encoding="utf-8"?>
+<file path=ppt/slides/slide7.xml><?xml version="1.0" encoding="utf-8"?>
 <p:sld xmlns:a="http://schemas.openxmlformats.org/drawingml/2006/main" xmlns:r="http://schemas.openxmlformats.org/officeDocument/2006/relationships" xmlns:p="http://schemas.openxmlformats.org/presentationml/2006/main">
   <p:cSld>
     <p:spTree>
@@ -5977,6 +7066,293 @@
     <p:extLst>
       <p:ext uri="{BB962C8B-B14F-4D97-AF65-F5344CB8AC3E}">
         <p14:creationId xmlns:p14="http://schemas.microsoft.com/office/powerpoint/2010/main" val="2705229135"/>
+      </p:ext>
+    </p:extLst>
+  </p:cSld>
+  <p:clrMapOvr>
+    <a:masterClrMapping/>
+  </p:clrMapOvr>
+</p:sld>
+</file>
+
+<file path=ppt/slides/slide8.xml><?xml version="1.0" encoding="utf-8"?>
+<p:sld xmlns:a="http://schemas.openxmlformats.org/drawingml/2006/main" xmlns:r="http://schemas.openxmlformats.org/officeDocument/2006/relationships" xmlns:p="http://schemas.openxmlformats.org/presentationml/2006/main">
+  <p:cSld>
+    <p:spTree>
+      <p:nvGrpSpPr>
+        <p:cNvPr id="1" name="">
+          <a:extLst>
+            <a:ext uri="{FF2B5EF4-FFF2-40B4-BE49-F238E27FC236}">
+              <a16:creationId xmlns:a16="http://schemas.microsoft.com/office/drawing/2014/main" id="{61BDA43F-06A6-E308-F58B-6837A9C3C131}"/>
+            </a:ext>
+          </a:extLst>
+        </p:cNvPr>
+        <p:cNvGrpSpPr/>
+        <p:nvPr/>
+      </p:nvGrpSpPr>
+      <p:grpSpPr>
+        <a:xfrm>
+          <a:off x="0" y="0"/>
+          <a:ext cx="0" cy="0"/>
+          <a:chOff x="0" y="0"/>
+          <a:chExt cx="0" cy="0"/>
+        </a:xfrm>
+      </p:grpSpPr>
+      <p:sp>
+        <p:nvSpPr>
+          <p:cNvPr id="6" name="CuadroTexto 5">
+            <a:extLst>
+              <a:ext uri="{FF2B5EF4-FFF2-40B4-BE49-F238E27FC236}">
+                <a16:creationId xmlns:a16="http://schemas.microsoft.com/office/drawing/2014/main" id="{9B04AD4F-AC21-E9CD-D57F-62BE47FFDDF3}"/>
+              </a:ext>
+            </a:extLst>
+          </p:cNvPr>
+          <p:cNvSpPr txBox="1"/>
+          <p:nvPr/>
+        </p:nvSpPr>
+        <p:spPr>
+          <a:xfrm>
+            <a:off x="1152746" y="203962"/>
+            <a:ext cx="5552854" cy="584775"/>
+          </a:xfrm>
+          <a:prstGeom prst="rect">
+            <a:avLst/>
+          </a:prstGeom>
+          <a:noFill/>
+          <a:ln w="19050">
+            <a:solidFill>
+              <a:schemeClr val="tx1"/>
+            </a:solidFill>
+          </a:ln>
+        </p:spPr>
+        <p:txBody>
+          <a:bodyPr wrap="square" rtlCol="0">
+            <a:spAutoFit/>
+          </a:bodyPr>
+          <a:lstStyle/>
+          <a:p>
+            <a:pPr algn="ctr"/>
+            <a:r>
+              <a:rPr lang="es-ES" sz="3200" b="1" dirty="0"/>
+              <a:t>C2 JAVA BASICS - condicionales</a:t>
+            </a:r>
+          </a:p>
+        </p:txBody>
+      </p:sp>
+      <p:sp>
+        <p:nvSpPr>
+          <p:cNvPr id="2" name="CuadroTexto 1">
+            <a:extLst>
+              <a:ext uri="{FF2B5EF4-FFF2-40B4-BE49-F238E27FC236}">
+                <a16:creationId xmlns:a16="http://schemas.microsoft.com/office/drawing/2014/main" id="{98783051-9D31-4AD9-AF2B-F9A7BFC3EBD9}"/>
+              </a:ext>
+            </a:extLst>
+          </p:cNvPr>
+          <p:cNvSpPr txBox="1"/>
+          <p:nvPr/>
+        </p:nvSpPr>
+        <p:spPr>
+          <a:xfrm>
+            <a:off x="162560" y="930976"/>
+            <a:ext cx="5333171" cy="3447098"/>
+          </a:xfrm>
+          <a:prstGeom prst="rect">
+            <a:avLst/>
+          </a:prstGeom>
+          <a:noFill/>
+          <a:ln>
+            <a:solidFill>
+              <a:schemeClr val="tx1"/>
+            </a:solidFill>
+            <a:prstDash val="lgDash"/>
+          </a:ln>
+        </p:spPr>
+        <p:txBody>
+          <a:bodyPr wrap="square" rtlCol="0">
+            <a:spAutoFit/>
+          </a:bodyPr>
+          <a:lstStyle/>
+          <a:p>
+            <a:pPr algn="ctr"/>
+            <a:r>
+              <a:rPr lang="es-ES" sz="2000" b="1" dirty="0"/>
+              <a:t>Condicional </a:t>
+            </a:r>
+            <a:r>
+              <a:rPr lang="es-ES" sz="2000" b="1" i="1" dirty="0"/>
+              <a:t>do </a:t>
+            </a:r>
+            <a:r>
+              <a:rPr lang="es-ES" sz="2000" b="1" i="1" dirty="0" err="1"/>
+              <a:t>while</a:t>
+            </a:r>
+            <a:r>
+              <a:rPr lang="es-ES" sz="2000" b="1" dirty="0"/>
+              <a:t>:</a:t>
+            </a:r>
+          </a:p>
+          <a:p>
+            <a:r>
+              <a:rPr lang="es-ES" b="1" dirty="0"/>
+              <a:t>do {</a:t>
+            </a:r>
+          </a:p>
+          <a:p>
+            <a:r>
+              <a:rPr lang="es-ES" b="1" dirty="0"/>
+              <a:t>        </a:t>
+            </a:r>
+            <a:r>
+              <a:rPr lang="es-ES" dirty="0"/>
+              <a:t>instrucciones</a:t>
+            </a:r>
+          </a:p>
+          <a:p>
+            <a:r>
+              <a:rPr lang="es-ES" b="1" dirty="0"/>
+              <a:t>        }</a:t>
+            </a:r>
+            <a:r>
+              <a:rPr lang="es-ES" b="1" dirty="0" err="1"/>
+              <a:t>while</a:t>
+            </a:r>
+            <a:r>
+              <a:rPr lang="es-ES" dirty="0"/>
+              <a:t>(</a:t>
+            </a:r>
+            <a:r>
+              <a:rPr lang="es-ES" b="1" dirty="0">
+                <a:solidFill>
+                  <a:schemeClr val="accent1"/>
+                </a:solidFill>
+              </a:rPr>
+              <a:t>condición</a:t>
+            </a:r>
+            <a:r>
+              <a:rPr lang="es-ES" dirty="0"/>
+              <a:t>);</a:t>
+            </a:r>
+            <a:endParaRPr lang="es-ES" b="1" dirty="0"/>
+          </a:p>
+          <a:p>
+            <a:endParaRPr lang="es-ES" b="1" dirty="0"/>
+          </a:p>
+          <a:p>
+            <a:r>
+              <a:rPr lang="es-ES" dirty="0"/>
+              <a:t>Es un bucle que se repite hasta que la condición expresada en </a:t>
+            </a:r>
+            <a:r>
+              <a:rPr lang="es-ES" i="1" dirty="0" err="1"/>
+              <a:t>while</a:t>
+            </a:r>
+            <a:r>
+              <a:rPr lang="es-ES" dirty="0"/>
+              <a:t> deja de cumplirse; es decir, se ejecutarán repetidamente las instrucciones proporcionadas una y otra vez hasta el cierre del bucle.</a:t>
+            </a:r>
+          </a:p>
+          <a:p>
+            <a:endParaRPr lang="es-ES" dirty="0"/>
+          </a:p>
+          <a:p>
+            <a:r>
+              <a:rPr lang="es-ES" dirty="0"/>
+              <a:t>Las instrucciones se describen en el bucle </a:t>
+            </a:r>
+            <a:r>
+              <a:rPr lang="es-ES" i="1" dirty="0"/>
+              <a:t>do</a:t>
+            </a:r>
+            <a:r>
+              <a:rPr lang="es-ES" dirty="0"/>
+              <a:t> exclusivamente.</a:t>
+            </a:r>
+          </a:p>
+        </p:txBody>
+      </p:sp>
+      <p:sp>
+        <p:nvSpPr>
+          <p:cNvPr id="7" name="Elipse 6">
+            <a:extLst>
+              <a:ext uri="{FF2B5EF4-FFF2-40B4-BE49-F238E27FC236}">
+                <a16:creationId xmlns:a16="http://schemas.microsoft.com/office/drawing/2014/main" id="{0207F66E-34B2-61AB-B522-E0ED9476CFC6}"/>
+              </a:ext>
+            </a:extLst>
+          </p:cNvPr>
+          <p:cNvSpPr/>
+          <p:nvPr/>
+        </p:nvSpPr>
+        <p:spPr>
+          <a:xfrm>
+            <a:off x="162558" y="73794"/>
+            <a:ext cx="785303" cy="755583"/>
+          </a:xfrm>
+          <a:prstGeom prst="ellipse">
+            <a:avLst/>
+          </a:prstGeom>
+        </p:spPr>
+        <p:style>
+          <a:lnRef idx="2">
+            <a:schemeClr val="accent1">
+              <a:shade val="15000"/>
+            </a:schemeClr>
+          </a:lnRef>
+          <a:fillRef idx="1">
+            <a:schemeClr val="accent1"/>
+          </a:fillRef>
+          <a:effectRef idx="0">
+            <a:schemeClr val="accent1"/>
+          </a:effectRef>
+          <a:fontRef idx="minor">
+            <a:schemeClr val="lt1"/>
+          </a:fontRef>
+        </p:style>
+        <p:txBody>
+          <a:bodyPr rtlCol="0" anchor="ctr"/>
+          <a:lstStyle/>
+          <a:p>
+            <a:pPr algn="ctr"/>
+            <a:r>
+              <a:rPr lang="es-ES" b="1" dirty="0"/>
+              <a:t>TA5</a:t>
+            </a:r>
+          </a:p>
+        </p:txBody>
+      </p:sp>
+      <p:pic>
+        <p:nvPicPr>
+          <p:cNvPr id="4" name="Imagen 3">
+            <a:extLst>
+              <a:ext uri="{FF2B5EF4-FFF2-40B4-BE49-F238E27FC236}">
+                <a16:creationId xmlns:a16="http://schemas.microsoft.com/office/drawing/2014/main" id="{AD0C1140-B734-B279-6BCF-600D7DE7FFB8}"/>
+              </a:ext>
+            </a:extLst>
+          </p:cNvPr>
+          <p:cNvPicPr>
+            <a:picLocks noChangeAspect="1"/>
+          </p:cNvPicPr>
+          <p:nvPr/>
+        </p:nvPicPr>
+        <p:blipFill>
+          <a:blip r:embed="rId2"/>
+          <a:stretch>
+            <a:fillRect/>
+          </a:stretch>
+        </p:blipFill>
+        <p:spPr>
+          <a:xfrm>
+            <a:off x="5641174" y="1042943"/>
+            <a:ext cx="6483084" cy="3053195"/>
+          </a:xfrm>
+          <a:prstGeom prst="rect">
+            <a:avLst/>
+          </a:prstGeom>
+        </p:spPr>
+      </p:pic>
+    </p:spTree>
+    <p:extLst>
+      <p:ext uri="{BB962C8B-B14F-4D97-AF65-F5344CB8AC3E}">
+        <p14:creationId xmlns:p14="http://schemas.microsoft.com/office/powerpoint/2010/main" val="3301792115"/>
       </p:ext>
     </p:extLst>
   </p:cSld>

</xml_diff>